<commit_message>
blog on for loops
</commit_message>
<xml_diff>
--- a/images/listing_images.pptx
+++ b/images/listing_images.pptx
@@ -8,6 +8,7 @@
     <p:sldId id="258" r:id="rId2"/>
     <p:sldId id="260" r:id="rId3"/>
     <p:sldId id="259" r:id="rId4"/>
+    <p:sldId id="261" r:id="rId5"/>
   </p:sldIdLst>
   <p:sldSz cx="12192000" cy="6858000"/>
   <p:notesSz cx="6858000" cy="9144000"/>
@@ -263,7 +264,7 @@
           <a:p>
             <a:fld id="{D66A3454-FE8B-43FF-A5CF-11748C0C9FCF}" type="datetimeFigureOut">
               <a:rPr lang="en-AU" smtClean="0"/>
-              <a:t>16/04/2025</a:t>
+              <a:t>18/04/2025</a:t>
             </a:fld>
             <a:endParaRPr lang="en-AU"/>
           </a:p>
@@ -463,7 +464,7 @@
           <a:p>
             <a:fld id="{D66A3454-FE8B-43FF-A5CF-11748C0C9FCF}" type="datetimeFigureOut">
               <a:rPr lang="en-AU" smtClean="0"/>
-              <a:t>16/04/2025</a:t>
+              <a:t>18/04/2025</a:t>
             </a:fld>
             <a:endParaRPr lang="en-AU"/>
           </a:p>
@@ -673,7 +674,7 @@
           <a:p>
             <a:fld id="{D66A3454-FE8B-43FF-A5CF-11748C0C9FCF}" type="datetimeFigureOut">
               <a:rPr lang="en-AU" smtClean="0"/>
-              <a:t>16/04/2025</a:t>
+              <a:t>18/04/2025</a:t>
             </a:fld>
             <a:endParaRPr lang="en-AU"/>
           </a:p>
@@ -873,7 +874,7 @@
           <a:p>
             <a:fld id="{D66A3454-FE8B-43FF-A5CF-11748C0C9FCF}" type="datetimeFigureOut">
               <a:rPr lang="en-AU" smtClean="0"/>
-              <a:t>16/04/2025</a:t>
+              <a:t>18/04/2025</a:t>
             </a:fld>
             <a:endParaRPr lang="en-AU"/>
           </a:p>
@@ -1149,7 +1150,7 @@
           <a:p>
             <a:fld id="{D66A3454-FE8B-43FF-A5CF-11748C0C9FCF}" type="datetimeFigureOut">
               <a:rPr lang="en-AU" smtClean="0"/>
-              <a:t>16/04/2025</a:t>
+              <a:t>18/04/2025</a:t>
             </a:fld>
             <a:endParaRPr lang="en-AU"/>
           </a:p>
@@ -1417,7 +1418,7 @@
           <a:p>
             <a:fld id="{D66A3454-FE8B-43FF-A5CF-11748C0C9FCF}" type="datetimeFigureOut">
               <a:rPr lang="en-AU" smtClean="0"/>
-              <a:t>16/04/2025</a:t>
+              <a:t>18/04/2025</a:t>
             </a:fld>
             <a:endParaRPr lang="en-AU"/>
           </a:p>
@@ -1832,7 +1833,7 @@
           <a:p>
             <a:fld id="{D66A3454-FE8B-43FF-A5CF-11748C0C9FCF}" type="datetimeFigureOut">
               <a:rPr lang="en-AU" smtClean="0"/>
-              <a:t>16/04/2025</a:t>
+              <a:t>18/04/2025</a:t>
             </a:fld>
             <a:endParaRPr lang="en-AU"/>
           </a:p>
@@ -1974,7 +1975,7 @@
           <a:p>
             <a:fld id="{D66A3454-FE8B-43FF-A5CF-11748C0C9FCF}" type="datetimeFigureOut">
               <a:rPr lang="en-AU" smtClean="0"/>
-              <a:t>16/04/2025</a:t>
+              <a:t>18/04/2025</a:t>
             </a:fld>
             <a:endParaRPr lang="en-AU"/>
           </a:p>
@@ -2087,7 +2088,7 @@
           <a:p>
             <a:fld id="{D66A3454-FE8B-43FF-A5CF-11748C0C9FCF}" type="datetimeFigureOut">
               <a:rPr lang="en-AU" smtClean="0"/>
-              <a:t>16/04/2025</a:t>
+              <a:t>18/04/2025</a:t>
             </a:fld>
             <a:endParaRPr lang="en-AU"/>
           </a:p>
@@ -2400,7 +2401,7 @@
           <a:p>
             <a:fld id="{D66A3454-FE8B-43FF-A5CF-11748C0C9FCF}" type="datetimeFigureOut">
               <a:rPr lang="en-AU" smtClean="0"/>
-              <a:t>16/04/2025</a:t>
+              <a:t>18/04/2025</a:t>
             </a:fld>
             <a:endParaRPr lang="en-AU"/>
           </a:p>
@@ -2689,7 +2690,7 @@
           <a:p>
             <a:fld id="{D66A3454-FE8B-43FF-A5CF-11748C0C9FCF}" type="datetimeFigureOut">
               <a:rPr lang="en-AU" smtClean="0"/>
-              <a:t>16/04/2025</a:t>
+              <a:t>18/04/2025</a:t>
             </a:fld>
             <a:endParaRPr lang="en-AU"/>
           </a:p>
@@ -2932,7 +2933,7 @@
           <a:p>
             <a:fld id="{D66A3454-FE8B-43FF-A5CF-11748C0C9FCF}" type="datetimeFigureOut">
               <a:rPr lang="en-AU" smtClean="0"/>
-              <a:t>16/04/2025</a:t>
+              <a:t>18/04/2025</a:t>
             </a:fld>
             <a:endParaRPr lang="en-AU"/>
           </a:p>
@@ -3793,6 +3794,573 @@
 </p:sld>
 </file>
 
+<file path=ppt/slides/slide4.xml><?xml version="1.0" encoding="utf-8"?>
+<p:sld xmlns:a="http://schemas.openxmlformats.org/drawingml/2006/main" xmlns:r="http://schemas.openxmlformats.org/officeDocument/2006/relationships" xmlns:p="http://schemas.openxmlformats.org/presentationml/2006/main">
+  <p:cSld>
+    <p:spTree>
+      <p:nvGrpSpPr>
+        <p:cNvPr id="1" name="">
+          <a:extLst>
+            <a:ext uri="{FF2B5EF4-FFF2-40B4-BE49-F238E27FC236}">
+              <a16:creationId xmlns:a16="http://schemas.microsoft.com/office/drawing/2014/main" id="{F6DC8F74-0C92-7108-7817-F30AFACA32F8}"/>
+            </a:ext>
+          </a:extLst>
+        </p:cNvPr>
+        <p:cNvGrpSpPr/>
+        <p:nvPr/>
+      </p:nvGrpSpPr>
+      <p:grpSpPr>
+        <a:xfrm>
+          <a:off x="0" y="0"/>
+          <a:ext cx="0" cy="0"/>
+          <a:chOff x="0" y="0"/>
+          <a:chExt cx="0" cy="0"/>
+        </a:xfrm>
+      </p:grpSpPr>
+      <p:sp>
+        <p:nvSpPr>
+          <p:cNvPr id="16" name="Rectangle 15">
+            <a:extLst>
+              <a:ext uri="{FF2B5EF4-FFF2-40B4-BE49-F238E27FC236}">
+                <a16:creationId xmlns:a16="http://schemas.microsoft.com/office/drawing/2014/main" id="{D9470EF1-4BC6-74F2-C11A-1B93A8285104}"/>
+              </a:ext>
+            </a:extLst>
+          </p:cNvPr>
+          <p:cNvSpPr/>
+          <p:nvPr/>
+        </p:nvSpPr>
+        <p:spPr>
+          <a:xfrm>
+            <a:off x="3326450" y="4396721"/>
+            <a:ext cx="5475600" cy="1800000"/>
+          </a:xfrm>
+          <a:prstGeom prst="rect">
+            <a:avLst/>
+          </a:prstGeom>
+          <a:solidFill>
+            <a:srgbClr val="00252A"/>
+          </a:solidFill>
+        </p:spPr>
+        <p:style>
+          <a:lnRef idx="2">
+            <a:schemeClr val="accent1">
+              <a:shade val="15000"/>
+            </a:schemeClr>
+          </a:lnRef>
+          <a:fillRef idx="1">
+            <a:schemeClr val="accent1"/>
+          </a:fillRef>
+          <a:effectRef idx="0">
+            <a:schemeClr val="accent1"/>
+          </a:effectRef>
+          <a:fontRef idx="minor">
+            <a:schemeClr val="lt1"/>
+          </a:fontRef>
+        </p:style>
+        <p:txBody>
+          <a:bodyPr rtlCol="0" anchor="ctr"/>
+          <a:lstStyle/>
+          <a:p>
+            <a:pPr algn="ctr"/>
+            <a:r>
+              <a:rPr lang="en-AU" sz="1400" dirty="0"/>
+              <a:t>5cmx15.21cm Placeholder Image</a:t>
+            </a:r>
+          </a:p>
+        </p:txBody>
+      </p:sp>
+      <p:grpSp>
+        <p:nvGrpSpPr>
+          <p:cNvPr id="24" name="Group 23">
+            <a:extLst>
+              <a:ext uri="{FF2B5EF4-FFF2-40B4-BE49-F238E27FC236}">
+                <a16:creationId xmlns:a16="http://schemas.microsoft.com/office/drawing/2014/main" id="{B037A4C1-C2E9-1D75-FB89-84B11A399404}"/>
+              </a:ext>
+            </a:extLst>
+          </p:cNvPr>
+          <p:cNvGrpSpPr/>
+          <p:nvPr/>
+        </p:nvGrpSpPr>
+        <p:grpSpPr>
+          <a:xfrm>
+            <a:off x="3877468" y="1073237"/>
+            <a:ext cx="4100747" cy="1531578"/>
+            <a:chOff x="3826668" y="1028787"/>
+            <a:chExt cx="4100747" cy="1531578"/>
+          </a:xfrm>
+        </p:grpSpPr>
+        <p:sp>
+          <p:nvSpPr>
+            <p:cNvPr id="2" name="TextBox 1">
+              <a:extLst>
+                <a:ext uri="{FF2B5EF4-FFF2-40B4-BE49-F238E27FC236}">
+                  <a16:creationId xmlns:a16="http://schemas.microsoft.com/office/drawing/2014/main" id="{9A8B242A-69C4-ECE6-3361-44435CE84098}"/>
+                </a:ext>
+              </a:extLst>
+            </p:cNvPr>
+            <p:cNvSpPr txBox="1"/>
+            <p:nvPr/>
+          </p:nvSpPr>
+          <p:spPr>
+            <a:xfrm>
+              <a:off x="3995271" y="1532966"/>
+              <a:ext cx="3932144" cy="523220"/>
+            </a:xfrm>
+            <a:prstGeom prst="rect">
+              <a:avLst/>
+            </a:prstGeom>
+            <a:noFill/>
+          </p:spPr>
+          <p:txBody>
+            <a:bodyPr wrap="square" rtlCol="0">
+              <a:spAutoFit/>
+            </a:bodyPr>
+            <a:lstStyle/>
+            <a:p>
+              <a:r>
+                <a:rPr lang="en-AU" sz="2800" dirty="0"/>
+                <a:t>for (i in 1:10){function}</a:t>
+              </a:r>
+            </a:p>
+          </p:txBody>
+        </p:sp>
+        <p:sp>
+          <p:nvSpPr>
+            <p:cNvPr id="3" name="Rectangle 2">
+              <a:extLst>
+                <a:ext uri="{FF2B5EF4-FFF2-40B4-BE49-F238E27FC236}">
+                  <a16:creationId xmlns:a16="http://schemas.microsoft.com/office/drawing/2014/main" id="{9379C5F0-968D-67D3-EE3D-D447DA568AAF}"/>
+                </a:ext>
+              </a:extLst>
+            </p:cNvPr>
+            <p:cNvSpPr/>
+            <p:nvPr/>
+          </p:nvSpPr>
+          <p:spPr>
+            <a:xfrm>
+              <a:off x="4673600" y="1584512"/>
+              <a:ext cx="161925" cy="423582"/>
+            </a:xfrm>
+            <a:prstGeom prst="rect">
+              <a:avLst/>
+            </a:prstGeom>
+            <a:solidFill>
+              <a:schemeClr val="accent1">
+                <a:alpha val="50196"/>
+              </a:schemeClr>
+            </a:solidFill>
+            <a:ln>
+              <a:solidFill>
+                <a:schemeClr val="accent1"/>
+              </a:solidFill>
+            </a:ln>
+          </p:spPr>
+          <p:style>
+            <a:lnRef idx="2">
+              <a:schemeClr val="accent1">
+                <a:shade val="15000"/>
+              </a:schemeClr>
+            </a:lnRef>
+            <a:fillRef idx="1">
+              <a:schemeClr val="accent1"/>
+            </a:fillRef>
+            <a:effectRef idx="0">
+              <a:schemeClr val="accent1"/>
+            </a:effectRef>
+            <a:fontRef idx="minor">
+              <a:schemeClr val="lt1"/>
+            </a:fontRef>
+          </p:style>
+          <p:txBody>
+            <a:bodyPr rtlCol="0" anchor="ctr"/>
+            <a:lstStyle/>
+            <a:p>
+              <a:pPr algn="ctr"/>
+              <a:endParaRPr lang="en-AU"/>
+            </a:p>
+          </p:txBody>
+        </p:sp>
+        <p:sp>
+          <p:nvSpPr>
+            <p:cNvPr id="4" name="Rectangle 3">
+              <a:extLst>
+                <a:ext uri="{FF2B5EF4-FFF2-40B4-BE49-F238E27FC236}">
+                  <a16:creationId xmlns:a16="http://schemas.microsoft.com/office/drawing/2014/main" id="{5AFB3544-3A60-B8A3-87EA-A06710672E78}"/>
+                </a:ext>
+              </a:extLst>
+            </p:cNvPr>
+            <p:cNvSpPr/>
+            <p:nvPr/>
+          </p:nvSpPr>
+          <p:spPr>
+            <a:xfrm>
+              <a:off x="5191124" y="1584512"/>
+              <a:ext cx="666751" cy="423582"/>
+            </a:xfrm>
+            <a:prstGeom prst="rect">
+              <a:avLst/>
+            </a:prstGeom>
+            <a:solidFill>
+              <a:schemeClr val="accent6">
+                <a:alpha val="50196"/>
+              </a:schemeClr>
+            </a:solidFill>
+            <a:ln>
+              <a:solidFill>
+                <a:schemeClr val="accent6"/>
+              </a:solidFill>
+            </a:ln>
+          </p:spPr>
+          <p:style>
+            <a:lnRef idx="2">
+              <a:schemeClr val="accent1">
+                <a:shade val="15000"/>
+              </a:schemeClr>
+            </a:lnRef>
+            <a:fillRef idx="1">
+              <a:schemeClr val="accent1"/>
+            </a:fillRef>
+            <a:effectRef idx="0">
+              <a:schemeClr val="accent1"/>
+            </a:effectRef>
+            <a:fontRef idx="minor">
+              <a:schemeClr val="lt1"/>
+            </a:fontRef>
+          </p:style>
+          <p:txBody>
+            <a:bodyPr rtlCol="0" anchor="ctr"/>
+            <a:lstStyle/>
+            <a:p>
+              <a:pPr algn="ctr"/>
+              <a:endParaRPr lang="en-AU"/>
+            </a:p>
+          </p:txBody>
+        </p:sp>
+        <p:sp>
+          <p:nvSpPr>
+            <p:cNvPr id="5" name="Rectangle 4">
+              <a:extLst>
+                <a:ext uri="{FF2B5EF4-FFF2-40B4-BE49-F238E27FC236}">
+                  <a16:creationId xmlns:a16="http://schemas.microsoft.com/office/drawing/2014/main" id="{0F88FEFE-065E-4BD9-5086-613EA16DD0F2}"/>
+                </a:ext>
+              </a:extLst>
+            </p:cNvPr>
+            <p:cNvSpPr/>
+            <p:nvPr/>
+          </p:nvSpPr>
+          <p:spPr>
+            <a:xfrm>
+              <a:off x="6064250" y="1582785"/>
+              <a:ext cx="1195911" cy="423582"/>
+            </a:xfrm>
+            <a:prstGeom prst="rect">
+              <a:avLst/>
+            </a:prstGeom>
+            <a:solidFill>
+              <a:schemeClr val="accent2">
+                <a:alpha val="50196"/>
+              </a:schemeClr>
+            </a:solidFill>
+            <a:ln>
+              <a:solidFill>
+                <a:schemeClr val="accent2"/>
+              </a:solidFill>
+            </a:ln>
+          </p:spPr>
+          <p:style>
+            <a:lnRef idx="2">
+              <a:schemeClr val="accent1">
+                <a:shade val="15000"/>
+              </a:schemeClr>
+            </a:lnRef>
+            <a:fillRef idx="1">
+              <a:schemeClr val="accent1"/>
+            </a:fillRef>
+            <a:effectRef idx="0">
+              <a:schemeClr val="accent1"/>
+            </a:effectRef>
+            <a:fontRef idx="minor">
+              <a:schemeClr val="lt1"/>
+            </a:fontRef>
+          </p:style>
+          <p:txBody>
+            <a:bodyPr rtlCol="0" anchor="ctr"/>
+            <a:lstStyle/>
+            <a:p>
+              <a:pPr algn="ctr"/>
+              <a:endParaRPr lang="en-AU"/>
+            </a:p>
+          </p:txBody>
+        </p:sp>
+        <p:sp>
+          <p:nvSpPr>
+            <p:cNvPr id="6" name="TextBox 5">
+              <a:extLst>
+                <a:ext uri="{FF2B5EF4-FFF2-40B4-BE49-F238E27FC236}">
+                  <a16:creationId xmlns:a16="http://schemas.microsoft.com/office/drawing/2014/main" id="{6E2A8547-AFCA-B4AD-0238-C5F8D274ECA9}"/>
+                </a:ext>
+              </a:extLst>
+            </p:cNvPr>
+            <p:cNvSpPr txBox="1"/>
+            <p:nvPr/>
+          </p:nvSpPr>
+          <p:spPr>
+            <a:xfrm>
+              <a:off x="4343400" y="1028787"/>
+              <a:ext cx="2362200" cy="369332"/>
+            </a:xfrm>
+            <a:prstGeom prst="rect">
+              <a:avLst/>
+            </a:prstGeom>
+            <a:noFill/>
+          </p:spPr>
+          <p:txBody>
+            <a:bodyPr wrap="square" rtlCol="0">
+              <a:spAutoFit/>
+            </a:bodyPr>
+            <a:lstStyle/>
+            <a:p>
+              <a:r>
+                <a:rPr lang="en-AU" dirty="0">
+                  <a:solidFill>
+                    <a:schemeClr val="accent6"/>
+                  </a:solidFill>
+                </a:rPr>
+                <a:t>The range to loop over.</a:t>
+              </a:r>
+            </a:p>
+          </p:txBody>
+        </p:sp>
+        <p:sp>
+          <p:nvSpPr>
+            <p:cNvPr id="7" name="TextBox 6">
+              <a:extLst>
+                <a:ext uri="{FF2B5EF4-FFF2-40B4-BE49-F238E27FC236}">
+                  <a16:creationId xmlns:a16="http://schemas.microsoft.com/office/drawing/2014/main" id="{EA5B5184-CB58-24B6-1A60-57E398BA0DCC}"/>
+                </a:ext>
+              </a:extLst>
+            </p:cNvPr>
+            <p:cNvSpPr txBox="1"/>
+            <p:nvPr/>
+          </p:nvSpPr>
+          <p:spPr>
+            <a:xfrm>
+              <a:off x="5596339" y="2191033"/>
+              <a:ext cx="2131733" cy="369332"/>
+            </a:xfrm>
+            <a:prstGeom prst="rect">
+              <a:avLst/>
+            </a:prstGeom>
+            <a:noFill/>
+          </p:spPr>
+          <p:txBody>
+            <a:bodyPr wrap="square" rtlCol="0">
+              <a:spAutoFit/>
+            </a:bodyPr>
+            <a:lstStyle/>
+            <a:p>
+              <a:r>
+                <a:rPr lang="en-AU" dirty="0">
+                  <a:solidFill>
+                    <a:schemeClr val="accent2"/>
+                  </a:solidFill>
+                </a:rPr>
+                <a:t>The thing to repeat.</a:t>
+              </a:r>
+            </a:p>
+          </p:txBody>
+        </p:sp>
+        <p:sp>
+          <p:nvSpPr>
+            <p:cNvPr id="8" name="TextBox 7">
+              <a:extLst>
+                <a:ext uri="{FF2B5EF4-FFF2-40B4-BE49-F238E27FC236}">
+                  <a16:creationId xmlns:a16="http://schemas.microsoft.com/office/drawing/2014/main" id="{CDCD0F40-C260-D176-BF4A-C503468091CC}"/>
+                </a:ext>
+              </a:extLst>
+            </p:cNvPr>
+            <p:cNvSpPr txBox="1"/>
+            <p:nvPr/>
+          </p:nvSpPr>
+          <p:spPr>
+            <a:xfrm>
+              <a:off x="3826668" y="2191033"/>
+              <a:ext cx="1855788" cy="369332"/>
+            </a:xfrm>
+            <a:prstGeom prst="rect">
+              <a:avLst/>
+            </a:prstGeom>
+            <a:noFill/>
+          </p:spPr>
+          <p:txBody>
+            <a:bodyPr wrap="square" rtlCol="0">
+              <a:spAutoFit/>
+            </a:bodyPr>
+            <a:lstStyle/>
+            <a:p>
+              <a:r>
+                <a:rPr lang="en-AU" dirty="0">
+                  <a:solidFill>
+                    <a:schemeClr val="accent1"/>
+                  </a:solidFill>
+                </a:rPr>
+                <a:t>The current loop.</a:t>
+              </a:r>
+            </a:p>
+          </p:txBody>
+        </p:sp>
+        <p:cxnSp>
+          <p:nvCxnSpPr>
+            <p:cNvPr id="10" name="Straight Arrow Connector 9">
+              <a:extLst>
+                <a:ext uri="{FF2B5EF4-FFF2-40B4-BE49-F238E27FC236}">
+                  <a16:creationId xmlns:a16="http://schemas.microsoft.com/office/drawing/2014/main" id="{A54A53A5-7D07-E2DB-7B32-88A7F7BD0E62}"/>
+                </a:ext>
+              </a:extLst>
+            </p:cNvPr>
+            <p:cNvCxnSpPr>
+              <a:cxnSpLocks/>
+              <a:stCxn id="8" idx="0"/>
+              <a:endCxn id="3" idx="2"/>
+            </p:cNvCxnSpPr>
+            <p:nvPr/>
+          </p:nvCxnSpPr>
+          <p:spPr>
+            <a:xfrm flipV="1">
+              <a:off x="4754562" y="2008094"/>
+              <a:ext cx="1" cy="182939"/>
+            </a:xfrm>
+            <a:prstGeom prst="straightConnector1">
+              <a:avLst/>
+            </a:prstGeom>
+            <a:ln>
+              <a:solidFill>
+                <a:schemeClr val="accent1"/>
+              </a:solidFill>
+              <a:tailEnd type="triangle"/>
+            </a:ln>
+          </p:spPr>
+          <p:style>
+            <a:lnRef idx="1">
+              <a:schemeClr val="accent1"/>
+            </a:lnRef>
+            <a:fillRef idx="0">
+              <a:schemeClr val="accent1"/>
+            </a:fillRef>
+            <a:effectRef idx="0">
+              <a:schemeClr val="accent1"/>
+            </a:effectRef>
+            <a:fontRef idx="minor">
+              <a:schemeClr val="tx1"/>
+            </a:fontRef>
+          </p:style>
+        </p:cxnSp>
+        <p:cxnSp>
+          <p:nvCxnSpPr>
+            <p:cNvPr id="11" name="Straight Arrow Connector 10">
+              <a:extLst>
+                <a:ext uri="{FF2B5EF4-FFF2-40B4-BE49-F238E27FC236}">
+                  <a16:creationId xmlns:a16="http://schemas.microsoft.com/office/drawing/2014/main" id="{C2C5402B-C90C-ECF3-6464-D24228999892}"/>
+                </a:ext>
+              </a:extLst>
+            </p:cNvPr>
+            <p:cNvCxnSpPr>
+              <a:cxnSpLocks/>
+              <a:stCxn id="7" idx="0"/>
+              <a:endCxn id="5" idx="2"/>
+            </p:cNvCxnSpPr>
+            <p:nvPr/>
+          </p:nvCxnSpPr>
+          <p:spPr>
+            <a:xfrm flipV="1">
+              <a:off x="6662206" y="2006367"/>
+              <a:ext cx="0" cy="184666"/>
+            </a:xfrm>
+            <a:prstGeom prst="straightConnector1">
+              <a:avLst/>
+            </a:prstGeom>
+            <a:ln>
+              <a:solidFill>
+                <a:schemeClr val="accent2"/>
+              </a:solidFill>
+              <a:tailEnd type="triangle"/>
+            </a:ln>
+          </p:spPr>
+          <p:style>
+            <a:lnRef idx="1">
+              <a:schemeClr val="accent1"/>
+            </a:lnRef>
+            <a:fillRef idx="0">
+              <a:schemeClr val="accent1"/>
+            </a:fillRef>
+            <a:effectRef idx="0">
+              <a:schemeClr val="accent1"/>
+            </a:effectRef>
+            <a:fontRef idx="minor">
+              <a:schemeClr val="tx1"/>
+            </a:fontRef>
+          </p:style>
+        </p:cxnSp>
+        <p:cxnSp>
+          <p:nvCxnSpPr>
+            <p:cNvPr id="12" name="Straight Arrow Connector 11">
+              <a:extLst>
+                <a:ext uri="{FF2B5EF4-FFF2-40B4-BE49-F238E27FC236}">
+                  <a16:creationId xmlns:a16="http://schemas.microsoft.com/office/drawing/2014/main" id="{A6E99A9E-2695-29E9-AE9C-D8808F403EF8}"/>
+                </a:ext>
+              </a:extLst>
+            </p:cNvPr>
+            <p:cNvCxnSpPr>
+              <a:cxnSpLocks/>
+              <a:stCxn id="6" idx="2"/>
+              <a:endCxn id="4" idx="0"/>
+            </p:cNvCxnSpPr>
+            <p:nvPr/>
+          </p:nvCxnSpPr>
+          <p:spPr>
+            <a:xfrm>
+              <a:off x="5524500" y="1398119"/>
+              <a:ext cx="0" cy="186393"/>
+            </a:xfrm>
+            <a:prstGeom prst="straightConnector1">
+              <a:avLst/>
+            </a:prstGeom>
+            <a:ln>
+              <a:solidFill>
+                <a:schemeClr val="accent6"/>
+              </a:solidFill>
+              <a:tailEnd type="triangle"/>
+            </a:ln>
+          </p:spPr>
+          <p:style>
+            <a:lnRef idx="1">
+              <a:schemeClr val="accent1"/>
+            </a:lnRef>
+            <a:fillRef idx="0">
+              <a:schemeClr val="accent1"/>
+            </a:fillRef>
+            <a:effectRef idx="0">
+              <a:schemeClr val="accent1"/>
+            </a:effectRef>
+            <a:fontRef idx="minor">
+              <a:schemeClr val="tx1"/>
+            </a:fontRef>
+          </p:style>
+        </p:cxnSp>
+      </p:grpSp>
+    </p:spTree>
+    <p:extLst>
+      <p:ext uri="{BB962C8B-B14F-4D97-AF65-F5344CB8AC3E}">
+        <p14:creationId xmlns:p14="http://schemas.microsoft.com/office/powerpoint/2010/main" val="1594896056"/>
+      </p:ext>
+    </p:extLst>
+  </p:cSld>
+  <p:clrMapOvr>
+    <a:masterClrMapping/>
+  </p:clrMapOvr>
+</p:sld>
+</file>
+
 <file path=ppt/theme/theme1.xml><?xml version="1.0" encoding="utf-8"?>
 <a:theme xmlns:a="http://schemas.openxmlformats.org/drawingml/2006/main" name="Office Theme">
   <a:themeElements>

</xml_diff>